<commit_message>
update summer school 2022
</commit_message>
<xml_diff>
--- a/Automated_Crypotocurrency_Trading/Slides_Cryptotrading_EN.pptx
+++ b/Automated_Crypotocurrency_Trading/Slides_Cryptotrading_EN.pptx
@@ -33,8 +33,8 @@
   <p:sldSz cx="9144000" cy="5143500" type="screen16x9"/>
   <p:notesSz cx="7099300" cy="10234613"/>
   <p:custDataLst>
+    <p:custData r:id="rId5"/>
     <p:custData r:id="rId6"/>
-    <p:custData r:id="rId5"/>
     <p:custData r:id="rId2"/>
     <p:custData r:id="rId4"/>
     <p:custData r:id="rId1"/>
@@ -277,7 +277,7 @@
             <a:fld id="{AA48851D-549D-4785-8040-D1740898315D}" type="datetime1">
               <a:rPr lang="de-CH" smtClean="0"/>
               <a:pPr/>
-              <a:t>08.07.2021</a:t>
+              <a:t>25.06.2022</a:t>
             </a:fld>
             <a:endParaRPr lang="fr-FR" dirty="0"/>
           </a:p>
@@ -444,7 +444,7 @@
             <a:fld id="{1C03A998-303B-4F86-9947-A49AF14B2D3A}" type="datetimeFigureOut">
               <a:rPr lang="fr-FR" smtClean="0"/>
               <a:pPr/>
-              <a:t>08/07/2021</a:t>
+              <a:t>25/06/2022</a:t>
             </a:fld>
             <a:endParaRPr lang="fr-FR" dirty="0"/>
           </a:p>
@@ -10744,7 +10744,7 @@
                   <a:schemeClr val="lt1"/>
                 </a:solidFill>
               </a:rPr>
-              <a:t> Bayonne 2021 | Cryptocurrency Trading-Bot Workshop</a:t>
+              <a:t> Bayonne 2022 | Cryptocurrency Trading-Bot Workshop</a:t>
             </a:r>
             <a:endParaRPr lang="de-CH" noProof="0" dirty="0"/>
           </a:p>
@@ -10969,7 +10969,7 @@
           <a:p>
             <a:r>
               <a:rPr lang="de-CH" dirty="0"/>
-              <a:t>Dr. Mario Gellrich, Summer School 2021 </a:t>
+              <a:t>Dr. Mario Gellrich, Summer School 2022</a:t>
             </a:r>
           </a:p>
         </p:txBody>
@@ -11371,7 +11371,7 @@
           <a:p>
             <a:r>
               <a:rPr lang="de-CH" dirty="0"/>
-              <a:t>Dr. Mario Gellrich, Summer School 2021 </a:t>
+              <a:t>Dr. Mario Gellrich, Summer School 2022</a:t>
             </a:r>
           </a:p>
         </p:txBody>
@@ -11759,7 +11759,7 @@
           <a:p>
             <a:r>
               <a:rPr lang="de-CH" dirty="0"/>
-              <a:t>Dr. Mario Gellrich, Summer School 2021 </a:t>
+              <a:t>Dr. Mario Gellrich, Summer School 2022</a:t>
             </a:r>
           </a:p>
         </p:txBody>
@@ -12146,7 +12146,7 @@
           <a:p>
             <a:r>
               <a:rPr lang="de-CH" dirty="0"/>
-              <a:t>Dr. Mario Gellrich, Summer School 2021 </a:t>
+              <a:t>Dr. Mario Gellrich, Summer School 2022</a:t>
             </a:r>
           </a:p>
         </p:txBody>
@@ -12602,7 +12602,7 @@
           <a:p>
             <a:r>
               <a:rPr lang="de-CH" dirty="0"/>
-              <a:t>Dr. Mario Gellrich, Summer School 2021 </a:t>
+              <a:t>Dr. Mario Gellrich, Summer School 2022</a:t>
             </a:r>
           </a:p>
         </p:txBody>
@@ -12888,7 +12888,7 @@
           <a:p>
             <a:r>
               <a:rPr lang="en-US" sz="1200" dirty="0"/>
-              <a:t> (4) Defining the Trading Strategy</a:t>
+              <a:t> (Topic 4) Defining the Trading Strategy</a:t>
             </a:r>
           </a:p>
           <a:p>
@@ -13154,7 +13154,7 @@
           <a:p>
             <a:r>
               <a:rPr lang="de-CH" dirty="0"/>
-              <a:t>Dr. Mario Gellrich, Summer School 2021 </a:t>
+              <a:t>Dr. Mario Gellrich, Summer School 2022</a:t>
             </a:r>
           </a:p>
         </p:txBody>
@@ -13191,7 +13191,7 @@
           <a:p>
             <a:r>
               <a:rPr lang="en-US" sz="1200" dirty="0"/>
-              <a:t> (5) </a:t>
+              <a:t> (Topic 5) </a:t>
             </a:r>
             <a:r>
               <a:rPr lang="en-US" sz="1200" dirty="0" err="1"/>
@@ -13281,7 +13281,7 @@
           <a:p>
             <a:r>
               <a:rPr lang="en-US" sz="1200" dirty="0"/>
-              <a:t> (6) Programing the Trading Bot </a:t>
+              <a:t> (Topic 6) Programing the Trading Bot </a:t>
             </a:r>
           </a:p>
           <a:p>
@@ -13366,7 +13366,7 @@
           <a:p>
             <a:r>
               <a:rPr lang="en-US" sz="1200" dirty="0"/>
-              <a:t> (7) Performance Analysis </a:t>
+              <a:t> (Topic 7) Performance Analysis </a:t>
             </a:r>
           </a:p>
           <a:p>
@@ -13711,7 +13711,7 @@
           <a:p>
             <a:r>
               <a:rPr lang="de-CH" dirty="0"/>
-              <a:t>Dr. Mario Gellrich, Summer School 2021 </a:t>
+              <a:t>Dr. Mario Gellrich, Summer School 2022</a:t>
             </a:r>
           </a:p>
         </p:txBody>
@@ -14180,7 +14180,7 @@
           <a:p>
             <a:r>
               <a:rPr lang="de-CH" dirty="0"/>
-              <a:t>Dr. Mario Gellrich, Summer School 2021 </a:t>
+              <a:t>Dr. Mario Gellrich, Summer School 2022</a:t>
             </a:r>
           </a:p>
         </p:txBody>
@@ -14330,15 +14330,7 @@
           <a:p>
             <a:r>
               <a:rPr lang="en-US" dirty="0"/>
-              <a:t>Minimal structure of the final presentation (</a:t>
-            </a:r>
-            <a:r>
-              <a:rPr lang="en-US" dirty="0" err="1"/>
-              <a:t>Jupyter</a:t>
-            </a:r>
-            <a:r>
-              <a:rPr lang="en-US" dirty="0"/>
-              <a:t> Notebook/HTML)</a:t>
+              <a:t>Minimal structure of the final presentation</a:t>
             </a:r>
           </a:p>
         </p:txBody>
@@ -14504,7 +14496,7 @@
           <a:p>
             <a:r>
               <a:rPr lang="de-CH" dirty="0"/>
-              <a:t>Dr. Mario Gellrich, Summer School 2021 </a:t>
+              <a:t>Dr. Mario Gellrich, Summer School 2022</a:t>
             </a:r>
           </a:p>
         </p:txBody>
@@ -14731,20 +14723,8 @@
           <a:lstStyle/>
           <a:p>
             <a:r>
-              <a:rPr lang="en-US" dirty="0" err="1"/>
-              <a:t>Programe</a:t>
-            </a:r>
-            <a:r>
               <a:rPr lang="en-US" dirty="0"/>
-              <a:t> for the 8</a:t>
-            </a:r>
-            <a:r>
-              <a:rPr lang="en-US" baseline="30000" dirty="0"/>
-              <a:t>th</a:t>
-            </a:r>
-            <a:r>
-              <a:rPr lang="en-US" dirty="0"/>
-              <a:t> of July</a:t>
+              <a:t>Program for July 8</a:t>
             </a:r>
           </a:p>
         </p:txBody>
@@ -14910,7 +14890,7 @@
           <a:p>
             <a:r>
               <a:rPr lang="de-CH" dirty="0"/>
-              <a:t>Dr. Mario Gellrich, Summer School 2021 </a:t>
+              <a:t>Dr. Mario Gellrich, Summer School 2022</a:t>
             </a:r>
           </a:p>
         </p:txBody>
@@ -14930,7 +14910,7 @@
           <p:nvPr>
             <p:extLst>
               <p:ext uri="{D42A27DB-BD31-4B8C-83A1-F6EECF244321}">
-                <p14:modId xmlns:p14="http://schemas.microsoft.com/office/powerpoint/2010/main" val="574391075"/>
+                <p14:modId xmlns:p14="http://schemas.microsoft.com/office/powerpoint/2010/main" val="4243781014"/>
               </p:ext>
             </p:extLst>
           </p:nvPr>
@@ -15539,7 +15519,7 @@
           <a:p>
             <a:r>
               <a:rPr lang="de-CH" dirty="0"/>
-              <a:t>Dr. Mario Gellrich, Summer School 2021 </a:t>
+              <a:t>Dr. Mario Gellrich, Summer School 2022</a:t>
             </a:r>
           </a:p>
         </p:txBody>
@@ -16162,7 +16142,7 @@
           <a:p>
             <a:r>
               <a:rPr lang="en-US" dirty="0"/>
-              <a:t>Prerequisites</a:t>
+              <a:t>Prerequisites for July 8</a:t>
             </a:r>
           </a:p>
         </p:txBody>
@@ -16328,7 +16308,7 @@
           <a:p>
             <a:r>
               <a:rPr lang="de-CH" dirty="0"/>
-              <a:t>Dr. Mario Gellrich, Summer School 2021 </a:t>
+              <a:t>Dr. Mario Gellrich, Summer School 2022</a:t>
             </a:r>
           </a:p>
         </p:txBody>
@@ -16947,7 +16927,7 @@
           <a:p>
             <a:r>
               <a:rPr lang="de-CH" dirty="0"/>
-              <a:t>Dr. Mario Gellrich, Summer School 2021 </a:t>
+              <a:t>Dr. Mario Gellrich, Summer School 2022</a:t>
             </a:r>
           </a:p>
         </p:txBody>
@@ -17099,7 +17079,7 @@
           <a:p>
             <a:r>
               <a:rPr lang="en-US" dirty="0"/>
-              <a:t>Self-Experiment April to July 2021 using </a:t>
+              <a:t>Self-Experiment using </a:t>
             </a:r>
             <a:r>
               <a:rPr lang="en-US" dirty="0" err="1"/>
@@ -17115,7 +17095,7 @@
             </a:r>
             <a:r>
               <a:rPr lang="en-US" dirty="0"/>
-              <a:t> (commercial bot)</a:t>
+              <a:t> (commercial trading bot)</a:t>
             </a:r>
             <a:endParaRPr lang="de-CH" dirty="0"/>
           </a:p>
@@ -17340,7 +17320,7 @@
           <a:p>
             <a:r>
               <a:rPr lang="de-CH" dirty="0"/>
-              <a:t>Dr. Mario Gellrich, Summer School 2021 </a:t>
+              <a:t>Dr. Mario Gellrich, Summer School 2022</a:t>
             </a:r>
           </a:p>
         </p:txBody>
@@ -17374,7 +17354,7 @@
           <a:p>
             <a:r>
               <a:rPr lang="en-US" dirty="0"/>
-              <a:t>Self-Experiment April to July 2021 using </a:t>
+              <a:t>Self-Experiment using </a:t>
             </a:r>
             <a:r>
               <a:rPr lang="en-US" dirty="0" err="1"/>
@@ -17390,7 +17370,7 @@
             </a:r>
             <a:r>
               <a:rPr lang="en-US" dirty="0"/>
-              <a:t> (commercial bot)</a:t>
+              <a:t> (commercial trading bot)</a:t>
             </a:r>
             <a:endParaRPr lang="de-CH" dirty="0"/>
           </a:p>
@@ -18334,7 +18314,7 @@
           <a:p>
             <a:r>
               <a:rPr lang="de-CH" dirty="0"/>
-              <a:t>Dr. Mario Gellrich, Summer School 2021 </a:t>
+              <a:t>Dr. Mario Gellrich, Summer School 2022</a:t>
             </a:r>
           </a:p>
         </p:txBody>
@@ -18797,7 +18777,7 @@
           <a:p>
             <a:r>
               <a:rPr lang="de-CH" dirty="0"/>
-              <a:t>Dr. Mario Gellrich, Summer School 2021 </a:t>
+              <a:t>Dr. Mario Gellrich, Summer School 2022</a:t>
             </a:r>
           </a:p>
         </p:txBody>
@@ -19244,7 +19224,7 @@
           <a:p>
             <a:r>
               <a:rPr lang="de-CH" dirty="0"/>
-              <a:t>Dr. Mario Gellrich, Summer School 2021 </a:t>
+              <a:t>Dr. Mario Gellrich, Summer School 2022</a:t>
             </a:r>
           </a:p>
         </p:txBody>
@@ -20238,11 +20218,11 @@
 </file>
 
 <file path=customXml/item5.xml><?xml version="1.0" encoding="utf-8"?>
-<VariableListDefinition name="AD_HOC" displayName="AD_HOC" id="cbf17c5a-5824-4c10-889d-65c6df0b3ad2" isdomainofvalue="False" dataSourceId="fa42598e-4842-4137-85b3-bc234252d283"/>
+<VariableList UniqueId="145657b4-b8f5-4796-b4d6-5ad0202156cb" Name="Computed" ContentType="XML" MajorVersion="0" MinorVersion="1" isLocalCopy="False" IsBaseObject="False" DataSourceId="d047bc2d-ea0e-4827-9c6c-eda3deaf492a" DataSourceMajorVersion="0" DataSourceMinorVersion="1"/>
 </file>
 
 <file path=customXml/item6.xml><?xml version="1.0" encoding="utf-8"?>
-<VariableList UniqueId="145657b4-b8f5-4796-b4d6-5ad0202156cb" Name="Computed" ContentType="XML" MajorVersion="0" MinorVersion="1" isLocalCopy="False" IsBaseObject="False" DataSourceId="d047bc2d-ea0e-4827-9c6c-eda3deaf492a" DataSourceMajorVersion="0" DataSourceMinorVersion="1"/>
+<VariableListDefinition name="AD_HOC" displayName="AD_HOC" id="cbf17c5a-5824-4c10-889d-65c6df0b3ad2" isdomainofvalue="False" dataSourceId="fa42598e-4842-4137-85b3-bc234252d283"/>
 </file>
 
 <file path=customXml/item7.xml><?xml version="1.0" encoding="utf-8"?>
@@ -20274,13 +20254,13 @@
 </file>
 
 <file path=customXml/itemProps5.xml><?xml version="1.0" encoding="utf-8"?>
-<ds:datastoreItem xmlns:ds="http://schemas.openxmlformats.org/officeDocument/2006/customXml" ds:itemID="{E733264B-5ECE-46BF-8FE3-7F0E0F6E4E16}">
+<ds:datastoreItem xmlns:ds="http://schemas.openxmlformats.org/officeDocument/2006/customXml" ds:itemID="{17A2846B-FC8E-49C9-8A38-DC56ED4E9F42}">
   <ds:schemaRefs/>
 </ds:datastoreItem>
 </file>
 
 <file path=customXml/itemProps6.xml><?xml version="1.0" encoding="utf-8"?>
-<ds:datastoreItem xmlns:ds="http://schemas.openxmlformats.org/officeDocument/2006/customXml" ds:itemID="{17A2846B-FC8E-49C9-8A38-DC56ED4E9F42}">
+<ds:datastoreItem xmlns:ds="http://schemas.openxmlformats.org/officeDocument/2006/customXml" ds:itemID="{E733264B-5ECE-46BF-8FE3-7F0E0F6E4E16}">
   <ds:schemaRefs/>
 </ds:datastoreItem>
 </file>

</xml_diff>

<commit_message>
update summer school FS2022
</commit_message>
<xml_diff>
--- a/Automated_Crypotocurrency_Trading/Slides_Cryptotrading_EN.pptx
+++ b/Automated_Crypotocurrency_Trading/Slides_Cryptotrading_EN.pptx
@@ -33,13 +33,13 @@
   <p:sldSz cx="9144000" cy="5143500" type="screen16x9"/>
   <p:notesSz cx="7099300" cy="10234613"/>
   <p:custDataLst>
+    <p:custData r:id="rId6"/>
     <p:custData r:id="rId5"/>
-    <p:custData r:id="rId6"/>
-    <p:custData r:id="rId2"/>
+    <p:custData r:id="rId3"/>
+    <p:custData r:id="rId7"/>
     <p:custData r:id="rId4"/>
     <p:custData r:id="rId1"/>
-    <p:custData r:id="rId3"/>
-    <p:custData r:id="rId7"/>
+    <p:custData r:id="rId2"/>
   </p:custDataLst>
   <p:defaultTextStyle>
     <a:defPPr>
@@ -277,7 +277,7 @@
             <a:fld id="{AA48851D-549D-4785-8040-D1740898315D}" type="datetime1">
               <a:rPr lang="de-CH" smtClean="0"/>
               <a:pPr/>
-              <a:t>25.06.2022</a:t>
+              <a:t>02.07.2022</a:t>
             </a:fld>
             <a:endParaRPr lang="fr-FR" dirty="0"/>
           </a:p>
@@ -444,7 +444,7 @@
             <a:fld id="{1C03A998-303B-4F86-9947-A49AF14B2D3A}" type="datetimeFigureOut">
               <a:rPr lang="fr-FR" smtClean="0"/>
               <a:pPr/>
-              <a:t>25/06/2022</a:t>
+              <a:t>02/07/2022</a:t>
             </a:fld>
             <a:endParaRPr lang="fr-FR" dirty="0"/>
           </a:p>
@@ -13445,7 +13445,7 @@
           <a:p>
             <a:r>
               <a:rPr lang="en-US" sz="1200" dirty="0"/>
-              <a:t> Other?</a:t>
+              <a:t> (Topic 8) Scheduling the Trading Bot</a:t>
             </a:r>
           </a:p>
           <a:p>
@@ -15654,7 +15654,7 @@
             </a:r>
             <a:r>
               <a:rPr lang="de-CH" sz="1400" dirty="0"/>
-              <a:t> (7 </a:t>
+              <a:t> (8 </a:t>
             </a:r>
             <a:r>
               <a:rPr lang="de-CH" sz="1400" dirty="0" err="1"/>
@@ -20202,71 +20202,71 @@
 </file>
 
 <file path=customXml/item1.xml><?xml version="1.0" encoding="utf-8"?>
+<VariableListDefinition name="Computed" displayName="Computed" id="145657b4-b8f5-4796-b4d6-5ad0202156cb" isdomainofvalue="False" dataSourceId="d047bc2d-ea0e-4827-9c6c-eda3deaf492a"/>
+</file>
+
+<file path=customXml/item2.xml><?xml version="1.0" encoding="utf-8"?>
+<VariableList UniqueId="cbf17c5a-5824-4c10-889d-65c6df0b3ad2" Name="AD_HOC" ContentType="XML" MajorVersion="0" MinorVersion="1" isLocalCopy="False" IsBaseObject="False" DataSourceId="fa42598e-4842-4137-85b3-bc234252d283" DataSourceMajorVersion="0" DataSourceMinorVersion="1"/>
+</file>
+
+<file path=customXml/item3.xml><?xml version="1.0" encoding="utf-8"?>
+<AllExternalAdhocVariableMappings/>
+</file>
+
+<file path=customXml/item4.xml><?xml version="1.0" encoding="utf-8"?>
 <VariableListDefinition name="System" displayName="System" id="f9d12240-e4e0-447c-a279-5cfbdc1d54bc" isdomainofvalue="False" dataSourceId="e900a022-2ee3-47aa-95bc-cf4962dd15bc"/>
 </file>
 
-<file path=customXml/item2.xml><?xml version="1.0" encoding="utf-8"?>
-<AllExternalAdhocVariableMappings/>
+<file path=customXml/item5.xml><?xml version="1.0" encoding="utf-8"?>
+<VariableListDefinition name="AD_HOC" displayName="AD_HOC" id="cbf17c5a-5824-4c10-889d-65c6df0b3ad2" isdomainofvalue="False" dataSourceId="fa42598e-4842-4137-85b3-bc234252d283"/>
 </file>
 
-<file path=customXml/item3.xml><?xml version="1.0" encoding="utf-8"?>
-<VariableListDefinition name="Computed" displayName="Computed" id="145657b4-b8f5-4796-b4d6-5ad0202156cb" isdomainofvalue="False" dataSourceId="d047bc2d-ea0e-4827-9c6c-eda3deaf492a"/>
+<file path=customXml/item6.xml><?xml version="1.0" encoding="utf-8"?>
+<VariableList UniqueId="145657b4-b8f5-4796-b4d6-5ad0202156cb" Name="Computed" ContentType="XML" MajorVersion="0" MinorVersion="1" isLocalCopy="False" IsBaseObject="False" DataSourceId="d047bc2d-ea0e-4827-9c6c-eda3deaf492a" DataSourceMajorVersion="0" DataSourceMinorVersion="1"/>
 </file>
 
-<file path=customXml/item4.xml><?xml version="1.0" encoding="utf-8"?>
+<file path=customXml/item7.xml><?xml version="1.0" encoding="utf-8"?>
 <VariableList UniqueId="f9d12240-e4e0-447c-a279-5cfbdc1d54bc" Name="System" ContentType="XML" MajorVersion="0" MinorVersion="1" isLocalCopy="False" IsBaseObject="False" DataSourceId="e900a022-2ee3-47aa-95bc-cf4962dd15bc" DataSourceMajorVersion="0" DataSourceMinorVersion="1"/>
 </file>
 
-<file path=customXml/item5.xml><?xml version="1.0" encoding="utf-8"?>
-<VariableList UniqueId="145657b4-b8f5-4796-b4d6-5ad0202156cb" Name="Computed" ContentType="XML" MajorVersion="0" MinorVersion="1" isLocalCopy="False" IsBaseObject="False" DataSourceId="d047bc2d-ea0e-4827-9c6c-eda3deaf492a" DataSourceMajorVersion="0" DataSourceMinorVersion="1"/>
+<file path=customXml/itemProps1.xml><?xml version="1.0" encoding="utf-8"?>
+<ds:datastoreItem xmlns:ds="http://schemas.openxmlformats.org/officeDocument/2006/customXml" ds:itemID="{EA62E2AA-386B-4B90-8CBA-CD0EE7FB646E}">
+  <ds:schemaRefs/>
+</ds:datastoreItem>
 </file>
 
-<file path=customXml/item6.xml><?xml version="1.0" encoding="utf-8"?>
-<VariableListDefinition name="AD_HOC" displayName="AD_HOC" id="cbf17c5a-5824-4c10-889d-65c6df0b3ad2" isdomainofvalue="False" dataSourceId="fa42598e-4842-4137-85b3-bc234252d283"/>
+<file path=customXml/itemProps2.xml><?xml version="1.0" encoding="utf-8"?>
+<ds:datastoreItem xmlns:ds="http://schemas.openxmlformats.org/officeDocument/2006/customXml" ds:itemID="{C2C751EE-D757-44D7-B62C-B1794CD6BE59}">
+  <ds:schemaRefs/>
+</ds:datastoreItem>
 </file>
 
-<file path=customXml/item7.xml><?xml version="1.0" encoding="utf-8"?>
-<VariableList UniqueId="cbf17c5a-5824-4c10-889d-65c6df0b3ad2" Name="AD_HOC" ContentType="XML" MajorVersion="0" MinorVersion="1" isLocalCopy="False" IsBaseObject="False" DataSourceId="fa42598e-4842-4137-85b3-bc234252d283" DataSourceMajorVersion="0" DataSourceMinorVersion="1"/>
+<file path=customXml/itemProps3.xml><?xml version="1.0" encoding="utf-8"?>
+<ds:datastoreItem xmlns:ds="http://schemas.openxmlformats.org/officeDocument/2006/customXml" ds:itemID="{5B1DE78D-2B0B-4D0D-A586-18E6B2BB4502}">
+  <ds:schemaRefs/>
+</ds:datastoreItem>
 </file>
 
-<file path=customXml/itemProps1.xml><?xml version="1.0" encoding="utf-8"?>
+<file path=customXml/itemProps4.xml><?xml version="1.0" encoding="utf-8"?>
 <ds:datastoreItem xmlns:ds="http://schemas.openxmlformats.org/officeDocument/2006/customXml" ds:itemID="{76F94A71-2C14-4177-8C82-6A59E103E987}">
   <ds:schemaRefs/>
 </ds:datastoreItem>
 </file>
 
-<file path=customXml/itemProps2.xml><?xml version="1.0" encoding="utf-8"?>
-<ds:datastoreItem xmlns:ds="http://schemas.openxmlformats.org/officeDocument/2006/customXml" ds:itemID="{5B1DE78D-2B0B-4D0D-A586-18E6B2BB4502}">
+<file path=customXml/itemProps5.xml><?xml version="1.0" encoding="utf-8"?>
+<ds:datastoreItem xmlns:ds="http://schemas.openxmlformats.org/officeDocument/2006/customXml" ds:itemID="{E733264B-5ECE-46BF-8FE3-7F0E0F6E4E16}">
   <ds:schemaRefs/>
 </ds:datastoreItem>
 </file>
 
-<file path=customXml/itemProps3.xml><?xml version="1.0" encoding="utf-8"?>
-<ds:datastoreItem xmlns:ds="http://schemas.openxmlformats.org/officeDocument/2006/customXml" ds:itemID="{EA62E2AA-386B-4B90-8CBA-CD0EE7FB646E}">
-  <ds:schemaRefs/>
-</ds:datastoreItem>
-</file>
-
-<file path=customXml/itemProps4.xml><?xml version="1.0" encoding="utf-8"?>
-<ds:datastoreItem xmlns:ds="http://schemas.openxmlformats.org/officeDocument/2006/customXml" ds:itemID="{76A0325B-5F5F-43A2-8090-4A18AFB661F6}">
-  <ds:schemaRefs/>
-</ds:datastoreItem>
-</file>
-
-<file path=customXml/itemProps5.xml><?xml version="1.0" encoding="utf-8"?>
+<file path=customXml/itemProps6.xml><?xml version="1.0" encoding="utf-8"?>
 <ds:datastoreItem xmlns:ds="http://schemas.openxmlformats.org/officeDocument/2006/customXml" ds:itemID="{17A2846B-FC8E-49C9-8A38-DC56ED4E9F42}">
   <ds:schemaRefs/>
 </ds:datastoreItem>
 </file>
 
-<file path=customXml/itemProps6.xml><?xml version="1.0" encoding="utf-8"?>
-<ds:datastoreItem xmlns:ds="http://schemas.openxmlformats.org/officeDocument/2006/customXml" ds:itemID="{E733264B-5ECE-46BF-8FE3-7F0E0F6E4E16}">
-  <ds:schemaRefs/>
-</ds:datastoreItem>
-</file>
-
 <file path=customXml/itemProps7.xml><?xml version="1.0" encoding="utf-8"?>
-<ds:datastoreItem xmlns:ds="http://schemas.openxmlformats.org/officeDocument/2006/customXml" ds:itemID="{C2C751EE-D757-44D7-B62C-B1794CD6BE59}">
+<ds:datastoreItem xmlns:ds="http://schemas.openxmlformats.org/officeDocument/2006/customXml" ds:itemID="{76A0325B-5F5F-43A2-8090-4A18AFB661F6}">
   <ds:schemaRefs/>
 </ds:datastoreItem>
 </file>
</xml_diff>